<commit_message>
modified:   formalizzazione e analisi della specifica.pptx 	modified:   librarySQL/datilibrary.sql 	modified:   librarySQL/procedurelibrary.sql 	modified:   librarySQL/schemalibrary.sql 	modified:   librarySQL/vistelibrary.sql 	modified:   modello concettuale/modello ER.png 	modified:   modello concettuale/modello concettuale.pptx 	modified:   modello logico/modello logico.pptx
</commit_message>
<xml_diff>
--- a/formalizzazione e analisi della specifica.pptx
+++ b/formalizzazione e analisi della specifica.pptx
@@ -114,6 +114,10 @@
 </p:presentation>
 </file>
 
+<file path=ppt/revisionInfo.xml><?xml version="1.0" encoding="utf-8"?>
+<p1510:revInfo xmlns:a="http://schemas.openxmlformats.org/drawingml/2006/main" xmlns:r="http://schemas.openxmlformats.org/officeDocument/2006/relationships" xmlns:p1510="http://schemas.microsoft.com/office/powerpoint/2015/10/main"/>
+</file>
+
 <file path=ppt/slideLayouts/slideLayout1.xml><?xml version="1.0" encoding="utf-8"?>
 <p:sldLayout xmlns:a="http://schemas.openxmlformats.org/drawingml/2006/main" xmlns:r="http://schemas.openxmlformats.org/officeDocument/2006/relationships" xmlns:p="http://schemas.openxmlformats.org/presentationml/2006/main" type="title" preserve="1">
   <p:cSld name="Diapositiva titolo">
@@ -245,7 +249,7 @@
           <a:p>
             <a:fld id="{F7F16067-9954-4C0E-92A1-BC0E6D3C3626}" type="datetimeFigureOut">
               <a:rPr lang="it-IT" smtClean="0"/>
-              <a:t>07/06/2018</a:t>
+              <a:t>26/06/2018</a:t>
             </a:fld>
             <a:endParaRPr lang="it-IT"/>
           </a:p>
@@ -415,7 +419,7 @@
           <a:p>
             <a:fld id="{F7F16067-9954-4C0E-92A1-BC0E6D3C3626}" type="datetimeFigureOut">
               <a:rPr lang="it-IT" smtClean="0"/>
-              <a:t>07/06/2018</a:t>
+              <a:t>26/06/2018</a:t>
             </a:fld>
             <a:endParaRPr lang="it-IT"/>
           </a:p>
@@ -595,7 +599,7 @@
           <a:p>
             <a:fld id="{F7F16067-9954-4C0E-92A1-BC0E6D3C3626}" type="datetimeFigureOut">
               <a:rPr lang="it-IT" smtClean="0"/>
-              <a:t>07/06/2018</a:t>
+              <a:t>26/06/2018</a:t>
             </a:fld>
             <a:endParaRPr lang="it-IT"/>
           </a:p>
@@ -765,7 +769,7 @@
           <a:p>
             <a:fld id="{F7F16067-9954-4C0E-92A1-BC0E6D3C3626}" type="datetimeFigureOut">
               <a:rPr lang="it-IT" smtClean="0"/>
-              <a:t>07/06/2018</a:t>
+              <a:t>26/06/2018</a:t>
             </a:fld>
             <a:endParaRPr lang="it-IT"/>
           </a:p>
@@ -1009,7 +1013,7 @@
           <a:p>
             <a:fld id="{F7F16067-9954-4C0E-92A1-BC0E6D3C3626}" type="datetimeFigureOut">
               <a:rPr lang="it-IT" smtClean="0"/>
-              <a:t>07/06/2018</a:t>
+              <a:t>26/06/2018</a:t>
             </a:fld>
             <a:endParaRPr lang="it-IT"/>
           </a:p>
@@ -1241,7 +1245,7 @@
           <a:p>
             <a:fld id="{F7F16067-9954-4C0E-92A1-BC0E6D3C3626}" type="datetimeFigureOut">
               <a:rPr lang="it-IT" smtClean="0"/>
-              <a:t>07/06/2018</a:t>
+              <a:t>26/06/2018</a:t>
             </a:fld>
             <a:endParaRPr lang="it-IT"/>
           </a:p>
@@ -1608,7 +1612,7 @@
           <a:p>
             <a:fld id="{F7F16067-9954-4C0E-92A1-BC0E6D3C3626}" type="datetimeFigureOut">
               <a:rPr lang="it-IT" smtClean="0"/>
-              <a:t>07/06/2018</a:t>
+              <a:t>26/06/2018</a:t>
             </a:fld>
             <a:endParaRPr lang="it-IT"/>
           </a:p>
@@ -1726,7 +1730,7 @@
           <a:p>
             <a:fld id="{F7F16067-9954-4C0E-92A1-BC0E6D3C3626}" type="datetimeFigureOut">
               <a:rPr lang="it-IT" smtClean="0"/>
-              <a:t>07/06/2018</a:t>
+              <a:t>26/06/2018</a:t>
             </a:fld>
             <a:endParaRPr lang="it-IT"/>
           </a:p>
@@ -1821,7 +1825,7 @@
           <a:p>
             <a:fld id="{F7F16067-9954-4C0E-92A1-BC0E6D3C3626}" type="datetimeFigureOut">
               <a:rPr lang="it-IT" smtClean="0"/>
-              <a:t>07/06/2018</a:t>
+              <a:t>26/06/2018</a:t>
             </a:fld>
             <a:endParaRPr lang="it-IT"/>
           </a:p>
@@ -2098,7 +2102,7 @@
           <a:p>
             <a:fld id="{F7F16067-9954-4C0E-92A1-BC0E6D3C3626}" type="datetimeFigureOut">
               <a:rPr lang="it-IT" smtClean="0"/>
-              <a:t>07/06/2018</a:t>
+              <a:t>26/06/2018</a:t>
             </a:fld>
             <a:endParaRPr lang="it-IT"/>
           </a:p>
@@ -2355,7 +2359,7 @@
           <a:p>
             <a:fld id="{F7F16067-9954-4C0E-92A1-BC0E6D3C3626}" type="datetimeFigureOut">
               <a:rPr lang="it-IT" smtClean="0"/>
-              <a:t>07/06/2018</a:t>
+              <a:t>26/06/2018</a:t>
             </a:fld>
             <a:endParaRPr lang="it-IT"/>
           </a:p>
@@ -2568,7 +2572,7 @@
           <a:p>
             <a:fld id="{F7F16067-9954-4C0E-92A1-BC0E6D3C3626}" type="datetimeFigureOut">
               <a:rPr lang="it-IT" smtClean="0"/>
-              <a:t>07/06/2018</a:t>
+              <a:t>26/06/2018</a:t>
             </a:fld>
             <a:endParaRPr lang="it-IT"/>
           </a:p>
@@ -3017,7 +3021,7 @@
             <p:ph idx="1"/>
             <p:extLst>
               <p:ext uri="{D42A27DB-BD31-4B8C-83A1-F6EECF244321}">
-                <p14:modId xmlns:p14="http://schemas.microsoft.com/office/powerpoint/2010/main" val="2994305032"/>
+                <p14:modId xmlns:p14="http://schemas.microsoft.com/office/powerpoint/2010/main" val="1924958318"/>
               </p:ext>
             </p:extLst>
           </p:nvPr>
@@ -3306,15 +3310,7 @@
                     <a:p>
                       <a:r>
                         <a:rPr lang="it-IT" sz="1700" dirty="0"/>
-                        <a:t>Utente della biblioteca, </a:t>
-                      </a:r>
-                      <a:r>
-                        <a:rPr lang="it-IT" sz="1700" dirty="0" err="1"/>
-                        <a:t>puo</a:t>
-                      </a:r>
-                      <a:r>
-                        <a:rPr lang="it-IT" sz="1700" dirty="0"/>
-                        <a:t> essere attivo o passivo</a:t>
+                        <a:t>Utente della biblioteca, può essere attivo o passivo</a:t>
                       </a:r>
                     </a:p>
                   </a:txBody>

</xml_diff>